<commit_message>
Isolated CSS variables to control MarkDown formatting.
</commit_message>
<xml_diff>
--- a/Design/Ux-Prototype.pptx
+++ b/Design/Ux-Prototype.pptx
@@ -6,6 +6,7 @@
   </p:sldMasterIdLst>
   <p:sldIdLst>
     <p:sldId id="256" r:id="rId2"/>
+    <p:sldId id="257" r:id="rId3"/>
   </p:sldIdLst>
   <p:sldSz cx="12192000" cy="6858000"/>
   <p:notesSz cx="6858000" cy="9144000"/>
@@ -104,6 +105,11 @@
       </a:defRPr>
     </a:lvl9pPr>
   </p:defaultTextStyle>
+  <p:extLst>
+    <p:ext uri="{EFAFB233-063F-42B5-8137-9DF3F51BA10A}">
+      <p15:sldGuideLst xmlns:p15="http://schemas.microsoft.com/office/powerpoint/2012/main"/>
+    </p:ext>
+  </p:extLst>
 </p:presentation>
 </file>
 
@@ -254,7 +260,7 @@
           <a:p>
             <a:fld id="{D8B9C5B3-F3E0-4F3F-93F8-D8F2E2D15056}" type="datetimeFigureOut">
               <a:rPr lang="en-US" smtClean="0"/>
-              <a:t>8/21/2024</a:t>
+              <a:t>8/22/2024</a:t>
             </a:fld>
             <a:endParaRPr lang="en-US"/>
           </a:p>
@@ -452,7 +458,7 @@
           <a:p>
             <a:fld id="{D8B9C5B3-F3E0-4F3F-93F8-D8F2E2D15056}" type="datetimeFigureOut">
               <a:rPr lang="en-US" smtClean="0"/>
-              <a:t>8/21/2024</a:t>
+              <a:t>8/22/2024</a:t>
             </a:fld>
             <a:endParaRPr lang="en-US"/>
           </a:p>
@@ -660,7 +666,7 @@
           <a:p>
             <a:fld id="{D8B9C5B3-F3E0-4F3F-93F8-D8F2E2D15056}" type="datetimeFigureOut">
               <a:rPr lang="en-US" smtClean="0"/>
-              <a:t>8/21/2024</a:t>
+              <a:t>8/22/2024</a:t>
             </a:fld>
             <a:endParaRPr lang="en-US"/>
           </a:p>
@@ -858,7 +864,7 @@
           <a:p>
             <a:fld id="{D8B9C5B3-F3E0-4F3F-93F8-D8F2E2D15056}" type="datetimeFigureOut">
               <a:rPr lang="en-US" smtClean="0"/>
-              <a:t>8/21/2024</a:t>
+              <a:t>8/22/2024</a:t>
             </a:fld>
             <a:endParaRPr lang="en-US"/>
           </a:p>
@@ -1133,7 +1139,7 @@
           <a:p>
             <a:fld id="{D8B9C5B3-F3E0-4F3F-93F8-D8F2E2D15056}" type="datetimeFigureOut">
               <a:rPr lang="en-US" smtClean="0"/>
-              <a:t>8/21/2024</a:t>
+              <a:t>8/22/2024</a:t>
             </a:fld>
             <a:endParaRPr lang="en-US"/>
           </a:p>
@@ -1398,7 +1404,7 @@
           <a:p>
             <a:fld id="{D8B9C5B3-F3E0-4F3F-93F8-D8F2E2D15056}" type="datetimeFigureOut">
               <a:rPr lang="en-US" smtClean="0"/>
-              <a:t>8/21/2024</a:t>
+              <a:t>8/22/2024</a:t>
             </a:fld>
             <a:endParaRPr lang="en-US"/>
           </a:p>
@@ -1810,7 +1816,7 @@
           <a:p>
             <a:fld id="{D8B9C5B3-F3E0-4F3F-93F8-D8F2E2D15056}" type="datetimeFigureOut">
               <a:rPr lang="en-US" smtClean="0"/>
-              <a:t>8/21/2024</a:t>
+              <a:t>8/22/2024</a:t>
             </a:fld>
             <a:endParaRPr lang="en-US"/>
           </a:p>
@@ -1951,7 +1957,7 @@
           <a:p>
             <a:fld id="{D8B9C5B3-F3E0-4F3F-93F8-D8F2E2D15056}" type="datetimeFigureOut">
               <a:rPr lang="en-US" smtClean="0"/>
-              <a:t>8/21/2024</a:t>
+              <a:t>8/22/2024</a:t>
             </a:fld>
             <a:endParaRPr lang="en-US"/>
           </a:p>
@@ -2064,7 +2070,7 @@
           <a:p>
             <a:fld id="{D8B9C5B3-F3E0-4F3F-93F8-D8F2E2D15056}" type="datetimeFigureOut">
               <a:rPr lang="en-US" smtClean="0"/>
-              <a:t>8/21/2024</a:t>
+              <a:t>8/22/2024</a:t>
             </a:fld>
             <a:endParaRPr lang="en-US"/>
           </a:p>
@@ -2375,7 +2381,7 @@
           <a:p>
             <a:fld id="{D8B9C5B3-F3E0-4F3F-93F8-D8F2E2D15056}" type="datetimeFigureOut">
               <a:rPr lang="en-US" smtClean="0"/>
-              <a:t>8/21/2024</a:t>
+              <a:t>8/22/2024</a:t>
             </a:fld>
             <a:endParaRPr lang="en-US"/>
           </a:p>
@@ -2663,7 +2669,7 @@
           <a:p>
             <a:fld id="{D8B9C5B3-F3E0-4F3F-93F8-D8F2E2D15056}" type="datetimeFigureOut">
               <a:rPr lang="en-US" smtClean="0"/>
-              <a:t>8/21/2024</a:t>
+              <a:t>8/22/2024</a:t>
             </a:fld>
             <a:endParaRPr lang="en-US"/>
           </a:p>
@@ -2904,7 +2910,7 @@
           <a:p>
             <a:fld id="{D8B9C5B3-F3E0-4F3F-93F8-D8F2E2D15056}" type="datetimeFigureOut">
               <a:rPr lang="en-US" smtClean="0"/>
-              <a:t>8/21/2024</a:t>
+              <a:t>8/22/2024</a:t>
             </a:fld>
             <a:endParaRPr lang="en-US"/>
           </a:p>
@@ -4927,6 +4933,1261 @@
 </p:sld>
 </file>
 
+<file path=ppt/slides/slide2.xml><?xml version="1.0" encoding="utf-8"?>
+<p:sld xmlns:a="http://schemas.openxmlformats.org/drawingml/2006/main" xmlns:r="http://schemas.openxmlformats.org/officeDocument/2006/relationships" xmlns:p="http://schemas.openxmlformats.org/presentationml/2006/main">
+  <p:cSld>
+    <p:bg>
+      <p:bgPr>
+        <a:solidFill>
+          <a:schemeClr val="accent6">
+            <a:lumMod val="75000"/>
+          </a:schemeClr>
+        </a:solidFill>
+        <a:effectLst/>
+      </p:bgPr>
+    </p:bg>
+    <p:spTree>
+      <p:nvGrpSpPr>
+        <p:cNvPr id="1" name=""/>
+        <p:cNvGrpSpPr/>
+        <p:nvPr/>
+      </p:nvGrpSpPr>
+      <p:grpSpPr>
+        <a:xfrm>
+          <a:off x="0" y="0"/>
+          <a:ext cx="0" cy="0"/>
+          <a:chOff x="0" y="0"/>
+          <a:chExt cx="0" cy="0"/>
+        </a:xfrm>
+      </p:grpSpPr>
+      <p:sp>
+        <p:nvSpPr>
+          <p:cNvPr id="4" name="Rectangle 3">
+            <a:extLst>
+              <a:ext uri="{FF2B5EF4-FFF2-40B4-BE49-F238E27FC236}">
+                <a16:creationId xmlns:a16="http://schemas.microsoft.com/office/drawing/2014/main" id="{3FA3E443-0B27-7784-8E34-2DEC3A726164}"/>
+              </a:ext>
+            </a:extLst>
+          </p:cNvPr>
+          <p:cNvSpPr/>
+          <p:nvPr/>
+        </p:nvSpPr>
+        <p:spPr>
+          <a:xfrm>
+            <a:off x="2684369" y="1021976"/>
+            <a:ext cx="9215718" cy="5486400"/>
+          </a:xfrm>
+          <a:prstGeom prst="rect">
+            <a:avLst/>
+          </a:prstGeom>
+        </p:spPr>
+        <p:style>
+          <a:lnRef idx="2">
+            <a:schemeClr val="dk1">
+              <a:shade val="15000"/>
+            </a:schemeClr>
+          </a:lnRef>
+          <a:fillRef idx="1">
+            <a:schemeClr val="dk1"/>
+          </a:fillRef>
+          <a:effectRef idx="0">
+            <a:schemeClr val="dk1"/>
+          </a:effectRef>
+          <a:fontRef idx="minor">
+            <a:schemeClr val="lt1"/>
+          </a:fontRef>
+        </p:style>
+        <p:txBody>
+          <a:bodyPr rtlCol="0" anchor="ctr"/>
+          <a:lstStyle/>
+          <a:p>
+            <a:pPr algn="ctr"/>
+            <a:endParaRPr lang="en-US" dirty="0"/>
+          </a:p>
+        </p:txBody>
+      </p:sp>
+      <p:sp>
+        <p:nvSpPr>
+          <p:cNvPr id="12" name="Rectangle 11">
+            <a:extLst>
+              <a:ext uri="{FF2B5EF4-FFF2-40B4-BE49-F238E27FC236}">
+                <a16:creationId xmlns:a16="http://schemas.microsoft.com/office/drawing/2014/main" id="{984CDCF9-A94E-D20B-D16C-AC1595F23614}"/>
+              </a:ext>
+            </a:extLst>
+          </p:cNvPr>
+          <p:cNvSpPr/>
+          <p:nvPr/>
+        </p:nvSpPr>
+        <p:spPr>
+          <a:xfrm>
+            <a:off x="4925546" y="1265493"/>
+            <a:ext cx="6974540" cy="234996"/>
+          </a:xfrm>
+          <a:prstGeom prst="rect">
+            <a:avLst/>
+          </a:prstGeom>
+          <a:solidFill>
+            <a:schemeClr val="tx1">
+              <a:lumMod val="75000"/>
+              <a:lumOff val="25000"/>
+            </a:schemeClr>
+          </a:solidFill>
+          <a:ln>
+            <a:solidFill>
+              <a:schemeClr val="bg2"/>
+            </a:solidFill>
+          </a:ln>
+        </p:spPr>
+        <p:style>
+          <a:lnRef idx="2">
+            <a:schemeClr val="accent3">
+              <a:shade val="15000"/>
+            </a:schemeClr>
+          </a:lnRef>
+          <a:fillRef idx="1">
+            <a:schemeClr val="accent3"/>
+          </a:fillRef>
+          <a:effectRef idx="0">
+            <a:schemeClr val="accent3"/>
+          </a:effectRef>
+          <a:fontRef idx="minor">
+            <a:schemeClr val="lt1"/>
+          </a:fontRef>
+        </p:style>
+        <p:txBody>
+          <a:bodyPr rtlCol="0" anchor="ctr"/>
+          <a:lstStyle/>
+          <a:p>
+            <a:pPr algn="ctr"/>
+            <a:endParaRPr lang="en-US"/>
+          </a:p>
+        </p:txBody>
+      </p:sp>
+      <p:sp>
+        <p:nvSpPr>
+          <p:cNvPr id="5" name="Rectangle 4">
+            <a:extLst>
+              <a:ext uri="{FF2B5EF4-FFF2-40B4-BE49-F238E27FC236}">
+                <a16:creationId xmlns:a16="http://schemas.microsoft.com/office/drawing/2014/main" id="{C4AA21C1-E95D-E069-BD5E-983F05DC974A}"/>
+              </a:ext>
+            </a:extLst>
+          </p:cNvPr>
+          <p:cNvSpPr/>
+          <p:nvPr/>
+        </p:nvSpPr>
+        <p:spPr>
+          <a:xfrm>
+            <a:off x="3132604" y="1270656"/>
+            <a:ext cx="1792942" cy="5237720"/>
+          </a:xfrm>
+          <a:prstGeom prst="rect">
+            <a:avLst/>
+          </a:prstGeom>
+          <a:solidFill>
+            <a:schemeClr val="tx1">
+              <a:lumMod val="75000"/>
+              <a:lumOff val="25000"/>
+            </a:schemeClr>
+          </a:solidFill>
+          <a:ln>
+            <a:solidFill>
+              <a:schemeClr val="bg2"/>
+            </a:solidFill>
+          </a:ln>
+        </p:spPr>
+        <p:style>
+          <a:lnRef idx="2">
+            <a:schemeClr val="accent3">
+              <a:shade val="15000"/>
+            </a:schemeClr>
+          </a:lnRef>
+          <a:fillRef idx="1">
+            <a:schemeClr val="accent3"/>
+          </a:fillRef>
+          <a:effectRef idx="0">
+            <a:schemeClr val="accent3"/>
+          </a:effectRef>
+          <a:fontRef idx="minor">
+            <a:schemeClr val="lt1"/>
+          </a:fontRef>
+        </p:style>
+        <p:txBody>
+          <a:bodyPr rtlCol="0" anchor="ctr"/>
+          <a:lstStyle/>
+          <a:p>
+            <a:pPr algn="ctr"/>
+            <a:endParaRPr lang="en-US"/>
+          </a:p>
+        </p:txBody>
+      </p:sp>
+      <p:sp>
+        <p:nvSpPr>
+          <p:cNvPr id="6" name="Rectangle 5">
+            <a:extLst>
+              <a:ext uri="{FF2B5EF4-FFF2-40B4-BE49-F238E27FC236}">
+                <a16:creationId xmlns:a16="http://schemas.microsoft.com/office/drawing/2014/main" id="{8F09604A-F29E-610C-D2D6-1B9E14B7C9CE}"/>
+              </a:ext>
+            </a:extLst>
+          </p:cNvPr>
+          <p:cNvSpPr/>
+          <p:nvPr/>
+        </p:nvSpPr>
+        <p:spPr>
+          <a:xfrm>
+            <a:off x="2684368" y="1021977"/>
+            <a:ext cx="9215717" cy="234996"/>
+          </a:xfrm>
+          <a:prstGeom prst="rect">
+            <a:avLst/>
+          </a:prstGeom>
+          <a:solidFill>
+            <a:schemeClr val="tx1">
+              <a:lumMod val="75000"/>
+              <a:lumOff val="25000"/>
+            </a:schemeClr>
+          </a:solidFill>
+          <a:ln>
+            <a:solidFill>
+              <a:schemeClr val="bg2"/>
+            </a:solidFill>
+          </a:ln>
+        </p:spPr>
+        <p:style>
+          <a:lnRef idx="2">
+            <a:schemeClr val="accent3">
+              <a:shade val="15000"/>
+            </a:schemeClr>
+          </a:lnRef>
+          <a:fillRef idx="1">
+            <a:schemeClr val="accent3"/>
+          </a:fillRef>
+          <a:effectRef idx="0">
+            <a:schemeClr val="accent3"/>
+          </a:effectRef>
+          <a:fontRef idx="minor">
+            <a:schemeClr val="lt1"/>
+          </a:fontRef>
+        </p:style>
+        <p:txBody>
+          <a:bodyPr rtlCol="0" anchor="ctr"/>
+          <a:lstStyle/>
+          <a:p>
+            <a:pPr algn="ctr"/>
+            <a:endParaRPr lang="en-US"/>
+          </a:p>
+        </p:txBody>
+      </p:sp>
+      <p:sp>
+        <p:nvSpPr>
+          <p:cNvPr id="7" name="TextBox 6">
+            <a:extLst>
+              <a:ext uri="{FF2B5EF4-FFF2-40B4-BE49-F238E27FC236}">
+                <a16:creationId xmlns:a16="http://schemas.microsoft.com/office/drawing/2014/main" id="{6365ED79-EF15-89F8-0BD6-FD02F644E682}"/>
+              </a:ext>
+            </a:extLst>
+          </p:cNvPr>
+          <p:cNvSpPr txBox="1"/>
+          <p:nvPr/>
+        </p:nvSpPr>
+        <p:spPr>
+          <a:xfrm>
+            <a:off x="4970367" y="1705468"/>
+            <a:ext cx="6705600" cy="2185214"/>
+          </a:xfrm>
+          <a:prstGeom prst="rect">
+            <a:avLst/>
+          </a:prstGeom>
+          <a:noFill/>
+        </p:spPr>
+        <p:txBody>
+          <a:bodyPr wrap="square" rtlCol="0">
+            <a:spAutoFit/>
+          </a:bodyPr>
+          <a:lstStyle/>
+          <a:p>
+            <a:r>
+              <a:rPr lang="en-US" sz="2800" dirty="0">
+                <a:solidFill>
+                  <a:schemeClr val="bg1">
+                    <a:lumMod val="95000"/>
+                  </a:schemeClr>
+                </a:solidFill>
+              </a:rPr>
+              <a:t>Mark Down Text</a:t>
+            </a:r>
+          </a:p>
+          <a:p>
+            <a:endParaRPr lang="en-US" dirty="0">
+              <a:solidFill>
+                <a:schemeClr val="bg1">
+                  <a:lumMod val="95000"/>
+                </a:schemeClr>
+              </a:solidFill>
+            </a:endParaRPr>
+          </a:p>
+          <a:p>
+            <a:r>
+              <a:rPr lang="en-US" dirty="0">
+                <a:solidFill>
+                  <a:schemeClr val="bg1">
+                    <a:lumMod val="95000"/>
+                  </a:schemeClr>
+                </a:solidFill>
+              </a:rPr>
+              <a:t>Our Markdown Text goes in here and has formatting and stuffs.</a:t>
+            </a:r>
+          </a:p>
+          <a:p>
+            <a:endParaRPr lang="en-US" dirty="0">
+              <a:solidFill>
+                <a:schemeClr val="bg1">
+                  <a:lumMod val="95000"/>
+                </a:schemeClr>
+              </a:solidFill>
+            </a:endParaRPr>
+          </a:p>
+          <a:p>
+            <a:pPr marL="342900" indent="-342900">
+              <a:buAutoNum type="arabicPeriod"/>
+            </a:pPr>
+            <a:r>
+              <a:rPr lang="en-US" dirty="0">
+                <a:solidFill>
+                  <a:schemeClr val="bg1">
+                    <a:lumMod val="95000"/>
+                  </a:schemeClr>
+                </a:solidFill>
+              </a:rPr>
+              <a:t>Think one.</a:t>
+            </a:r>
+          </a:p>
+          <a:p>
+            <a:pPr marL="342900" indent="-342900">
+              <a:buAutoNum type="arabicPeriod"/>
+            </a:pPr>
+            <a:r>
+              <a:rPr lang="en-US" dirty="0">
+                <a:solidFill>
+                  <a:schemeClr val="bg1">
+                    <a:lumMod val="95000"/>
+                  </a:schemeClr>
+                </a:solidFill>
+              </a:rPr>
+              <a:t>Thing 2.</a:t>
+            </a:r>
+          </a:p>
+          <a:p>
+            <a:pPr marL="342900" indent="-342900">
+              <a:buAutoNum type="arabicPeriod"/>
+            </a:pPr>
+            <a:r>
+              <a:rPr lang="en-US" dirty="0">
+                <a:solidFill>
+                  <a:schemeClr val="bg1">
+                    <a:lumMod val="95000"/>
+                  </a:schemeClr>
+                </a:solidFill>
+              </a:rPr>
+              <a:t>Thing C.</a:t>
+            </a:r>
+          </a:p>
+        </p:txBody>
+      </p:sp>
+      <p:sp>
+        <p:nvSpPr>
+          <p:cNvPr id="8" name="TextBox 7">
+            <a:extLst>
+              <a:ext uri="{FF2B5EF4-FFF2-40B4-BE49-F238E27FC236}">
+                <a16:creationId xmlns:a16="http://schemas.microsoft.com/office/drawing/2014/main" id="{00B79B83-A4C7-B764-6891-EA3B70DAE3B0}"/>
+              </a:ext>
+            </a:extLst>
+          </p:cNvPr>
+          <p:cNvSpPr txBox="1"/>
+          <p:nvPr/>
+        </p:nvSpPr>
+        <p:spPr>
+          <a:xfrm>
+            <a:off x="3132604" y="1008983"/>
+            <a:ext cx="3802516" cy="276999"/>
+          </a:xfrm>
+          <a:prstGeom prst="rect">
+            <a:avLst/>
+          </a:prstGeom>
+          <a:noFill/>
+        </p:spPr>
+        <p:txBody>
+          <a:bodyPr wrap="none" rtlCol="0">
+            <a:spAutoFit/>
+          </a:bodyPr>
+          <a:lstStyle/>
+          <a:p>
+            <a:r>
+              <a:rPr lang="en-US" sz="1200" dirty="0">
+                <a:solidFill>
+                  <a:schemeClr val="accent4"/>
+                </a:solidFill>
+                <a:hlinkClick r:id="rId2">
+                  <a:extLst>
+                    <a:ext uri="{A12FA001-AC4F-418D-AE19-62706E023703}">
+                      <ahyp:hlinkClr xmlns:ahyp="http://schemas.microsoft.com/office/drawing/2018/hyperlinkcolor" val="tx"/>
+                    </a:ext>
+                  </a:extLst>
+                </a:hlinkClick>
+              </a:rPr>
+              <a:t>Root Folder</a:t>
+            </a:r>
+            <a:r>
+              <a:rPr lang="en-US" sz="1200" dirty="0">
+                <a:solidFill>
+                  <a:srgbClr val="0563C1"/>
+                </a:solidFill>
+                <a:hlinkClick r:id="rId2">
+                  <a:extLst>
+                    <a:ext uri="{A12FA001-AC4F-418D-AE19-62706E023703}">
+                      <ahyp:hlinkClr xmlns:ahyp="http://schemas.microsoft.com/office/drawing/2018/hyperlinkcolor" val="tx"/>
+                    </a:ext>
+                  </a:extLst>
+                </a:hlinkClick>
+              </a:rPr>
+              <a:t> </a:t>
+            </a:r>
+            <a:r>
+              <a:rPr lang="en-US" sz="1200" dirty="0">
+                <a:solidFill>
+                  <a:schemeClr val="bg1">
+                    <a:lumMod val="95000"/>
+                  </a:schemeClr>
+                </a:solidFill>
+              </a:rPr>
+              <a:t>| </a:t>
+            </a:r>
+            <a:r>
+              <a:rPr lang="en-US" sz="1200" dirty="0">
+                <a:solidFill>
+                  <a:schemeClr val="accent4"/>
+                </a:solidFill>
+                <a:hlinkClick r:id="rId3">
+                  <a:extLst>
+                    <a:ext uri="{A12FA001-AC4F-418D-AE19-62706E023703}">
+                      <ahyp:hlinkClr xmlns:ahyp="http://schemas.microsoft.com/office/drawing/2018/hyperlinkcolor" val="tx"/>
+                    </a:ext>
+                  </a:extLst>
+                </a:hlinkClick>
+              </a:rPr>
+              <a:t>Child Folder </a:t>
+            </a:r>
+            <a:r>
+              <a:rPr lang="en-US" sz="1200" dirty="0">
+                <a:solidFill>
+                  <a:schemeClr val="bg1">
+                    <a:lumMod val="95000"/>
+                  </a:schemeClr>
+                </a:solidFill>
+              </a:rPr>
+              <a:t>| Current Folder | </a:t>
+            </a:r>
+            <a:r>
+              <a:rPr lang="en-US" sz="1200" dirty="0">
+                <a:solidFill>
+                  <a:schemeClr val="bg2"/>
+                </a:solidFill>
+                <a:latin typeface="Wingdings" panose="05000000000000000000" pitchFamily="2" charset="2"/>
+              </a:rPr>
+              <a:t>2</a:t>
+            </a:r>
+            <a:r>
+              <a:rPr lang="en-US" sz="1200" dirty="0">
+                <a:solidFill>
+                  <a:schemeClr val="bg1">
+                    <a:lumMod val="95000"/>
+                  </a:schemeClr>
+                </a:solidFill>
+              </a:rPr>
+              <a:t> File 3.md</a:t>
+            </a:r>
+          </a:p>
+        </p:txBody>
+      </p:sp>
+      <p:sp>
+        <p:nvSpPr>
+          <p:cNvPr id="10" name="TextBox 9">
+            <a:extLst>
+              <a:ext uri="{FF2B5EF4-FFF2-40B4-BE49-F238E27FC236}">
+                <a16:creationId xmlns:a16="http://schemas.microsoft.com/office/drawing/2014/main" id="{4C6FDD7D-3FD5-FB7E-D93F-81689BA2653E}"/>
+              </a:ext>
+            </a:extLst>
+          </p:cNvPr>
+          <p:cNvSpPr txBox="1"/>
+          <p:nvPr/>
+        </p:nvSpPr>
+        <p:spPr>
+          <a:xfrm>
+            <a:off x="3293970" y="1285982"/>
+            <a:ext cx="1097095" cy="1754326"/>
+          </a:xfrm>
+          <a:prstGeom prst="rect">
+            <a:avLst/>
+          </a:prstGeom>
+          <a:noFill/>
+        </p:spPr>
+        <p:txBody>
+          <a:bodyPr wrap="none" rtlCol="0">
+            <a:spAutoFit/>
+          </a:bodyPr>
+          <a:lstStyle/>
+          <a:p>
+            <a:r>
+              <a:rPr lang="en-US" sz="1200" dirty="0">
+                <a:solidFill>
+                  <a:schemeClr val="accent4"/>
+                </a:solidFill>
+              </a:rPr>
+              <a:t>Child Folder 1</a:t>
+            </a:r>
+          </a:p>
+          <a:p>
+            <a:r>
+              <a:rPr lang="en-US" sz="1200" dirty="0">
+                <a:solidFill>
+                  <a:schemeClr val="accent4"/>
+                </a:solidFill>
+              </a:rPr>
+              <a:t>Child Folder 2</a:t>
+            </a:r>
+          </a:p>
+          <a:p>
+            <a:r>
+              <a:rPr lang="en-US" sz="1200" dirty="0">
+                <a:solidFill>
+                  <a:schemeClr val="accent4"/>
+                </a:solidFill>
+              </a:rPr>
+              <a:t>Child Folder 3</a:t>
+            </a:r>
+          </a:p>
+          <a:p>
+            <a:r>
+              <a:rPr lang="en-US" sz="1200" dirty="0">
+                <a:solidFill>
+                  <a:schemeClr val="accent4"/>
+                </a:solidFill>
+                <a:latin typeface="Segoe MDL2 Assets" panose="050A0102010101010101" pitchFamily="18" charset="0"/>
+              </a:rPr>
+              <a:t> </a:t>
+            </a:r>
+            <a:r>
+              <a:rPr lang="en-US" sz="1200" dirty="0">
+                <a:solidFill>
+                  <a:schemeClr val="accent4"/>
+                </a:solidFill>
+              </a:rPr>
+              <a:t>New Folder</a:t>
+            </a:r>
+          </a:p>
+          <a:p>
+            <a:endParaRPr lang="en-US" sz="1200" dirty="0">
+              <a:solidFill>
+                <a:schemeClr val="accent4"/>
+              </a:solidFill>
+            </a:endParaRPr>
+          </a:p>
+          <a:p>
+            <a:r>
+              <a:rPr lang="en-US" sz="1200" dirty="0">
+                <a:solidFill>
+                  <a:schemeClr val="accent4"/>
+                </a:solidFill>
+              </a:rPr>
+              <a:t>File 1.md</a:t>
+            </a:r>
+          </a:p>
+          <a:p>
+            <a:r>
+              <a:rPr lang="en-US" sz="1200" dirty="0">
+                <a:solidFill>
+                  <a:schemeClr val="accent4"/>
+                </a:solidFill>
+              </a:rPr>
+              <a:t>File 2.md</a:t>
+            </a:r>
+          </a:p>
+          <a:p>
+            <a:r>
+              <a:rPr lang="en-US" sz="1200" dirty="0">
+                <a:solidFill>
+                  <a:schemeClr val="bg2"/>
+                </a:solidFill>
+              </a:rPr>
+              <a:t>File 3.md</a:t>
+            </a:r>
+          </a:p>
+          <a:p>
+            <a:r>
+              <a:rPr lang="en-US" sz="1200" dirty="0">
+                <a:solidFill>
+                  <a:schemeClr val="accent4"/>
+                </a:solidFill>
+                <a:latin typeface="Segoe MDL2 Assets" panose="050A0102010101010101" pitchFamily="18" charset="0"/>
+              </a:rPr>
+              <a:t></a:t>
+            </a:r>
+            <a:r>
+              <a:rPr lang="en-US" sz="1200" dirty="0">
+                <a:solidFill>
+                  <a:schemeClr val="bg2"/>
+                </a:solidFill>
+                <a:latin typeface="Segoe MDL2 Assets" panose="050A0102010101010101" pitchFamily="18" charset="0"/>
+              </a:rPr>
+              <a:t> </a:t>
+            </a:r>
+            <a:r>
+              <a:rPr lang="en-US" sz="1200" dirty="0">
+                <a:solidFill>
+                  <a:schemeClr val="accent4"/>
+                </a:solidFill>
+              </a:rPr>
+              <a:t>New File</a:t>
+            </a:r>
+          </a:p>
+        </p:txBody>
+      </p:sp>
+      <p:sp>
+        <p:nvSpPr>
+          <p:cNvPr id="11" name="TextBox 10">
+            <a:extLst>
+              <a:ext uri="{FF2B5EF4-FFF2-40B4-BE49-F238E27FC236}">
+                <a16:creationId xmlns:a16="http://schemas.microsoft.com/office/drawing/2014/main" id="{C2691933-F2C9-DEC9-7FD8-F8FD8D9BC117}"/>
+              </a:ext>
+            </a:extLst>
+          </p:cNvPr>
+          <p:cNvSpPr txBox="1"/>
+          <p:nvPr/>
+        </p:nvSpPr>
+        <p:spPr>
+          <a:xfrm>
+            <a:off x="3087783" y="1285981"/>
+            <a:ext cx="338554" cy="1569660"/>
+          </a:xfrm>
+          <a:prstGeom prst="rect">
+            <a:avLst/>
+          </a:prstGeom>
+          <a:noFill/>
+        </p:spPr>
+        <p:txBody>
+          <a:bodyPr wrap="none" rtlCol="0">
+            <a:spAutoFit/>
+          </a:bodyPr>
+          <a:lstStyle/>
+          <a:p>
+            <a:r>
+              <a:rPr lang="en-US" sz="1200" dirty="0">
+                <a:solidFill>
+                  <a:schemeClr val="accent4"/>
+                </a:solidFill>
+                <a:latin typeface="Segoe MDL2 Assets" panose="050A0102010101010101" pitchFamily="18" charset="0"/>
+              </a:rPr>
+              <a:t></a:t>
+            </a:r>
+          </a:p>
+          <a:p>
+            <a:r>
+              <a:rPr lang="en-US" sz="1200" dirty="0">
+                <a:solidFill>
+                  <a:schemeClr val="accent4"/>
+                </a:solidFill>
+                <a:latin typeface="Segoe MDL2 Assets" panose="050A0102010101010101" pitchFamily="18" charset="0"/>
+              </a:rPr>
+              <a:t></a:t>
+            </a:r>
+          </a:p>
+          <a:p>
+            <a:r>
+              <a:rPr lang="en-US" sz="1200" dirty="0">
+                <a:solidFill>
+                  <a:schemeClr val="accent4"/>
+                </a:solidFill>
+                <a:latin typeface="Segoe MDL2 Assets" panose="050A0102010101010101" pitchFamily="18" charset="0"/>
+              </a:rPr>
+              <a:t></a:t>
+            </a:r>
+            <a:endParaRPr lang="en-US" sz="1000" dirty="0">
+              <a:solidFill>
+                <a:schemeClr val="accent4"/>
+              </a:solidFill>
+              <a:latin typeface="Wingdings" panose="05000000000000000000" pitchFamily="2" charset="2"/>
+            </a:endParaRPr>
+          </a:p>
+          <a:p>
+            <a:endParaRPr lang="en-US" sz="1200" dirty="0">
+              <a:solidFill>
+                <a:schemeClr val="accent4"/>
+              </a:solidFill>
+              <a:latin typeface="Wingdings" panose="05000000000000000000" pitchFamily="2" charset="2"/>
+            </a:endParaRPr>
+          </a:p>
+          <a:p>
+            <a:endParaRPr lang="en-US" sz="1200" dirty="0">
+              <a:solidFill>
+                <a:schemeClr val="accent4"/>
+              </a:solidFill>
+              <a:latin typeface="Wingdings" panose="05000000000000000000" pitchFamily="2" charset="2"/>
+            </a:endParaRPr>
+          </a:p>
+          <a:p>
+            <a:r>
+              <a:rPr lang="en-US" sz="1200" dirty="0">
+                <a:solidFill>
+                  <a:schemeClr val="accent4"/>
+                </a:solidFill>
+                <a:latin typeface="Wingdings" panose="05000000000000000000" pitchFamily="2" charset="2"/>
+              </a:rPr>
+              <a:t>2</a:t>
+            </a:r>
+          </a:p>
+          <a:p>
+            <a:r>
+              <a:rPr lang="en-US" sz="1200" dirty="0">
+                <a:solidFill>
+                  <a:schemeClr val="accent4"/>
+                </a:solidFill>
+                <a:latin typeface="Wingdings" panose="05000000000000000000" pitchFamily="2" charset="2"/>
+              </a:rPr>
+              <a:t>2</a:t>
+            </a:r>
+          </a:p>
+          <a:p>
+            <a:r>
+              <a:rPr lang="en-US" sz="1200" dirty="0">
+                <a:solidFill>
+                  <a:schemeClr val="bg2"/>
+                </a:solidFill>
+                <a:latin typeface="Wingdings" panose="05000000000000000000" pitchFamily="2" charset="2"/>
+              </a:rPr>
+              <a:t>2</a:t>
+            </a:r>
+            <a:endParaRPr lang="en-US" sz="1200" dirty="0">
+              <a:solidFill>
+                <a:schemeClr val="bg2"/>
+              </a:solidFill>
+            </a:endParaRPr>
+          </a:p>
+        </p:txBody>
+      </p:sp>
+      <p:pic>
+        <p:nvPicPr>
+          <p:cNvPr id="1030" name="Picture 6">
+            <a:extLst>
+              <a:ext uri="{FF2B5EF4-FFF2-40B4-BE49-F238E27FC236}">
+                <a16:creationId xmlns:a16="http://schemas.microsoft.com/office/drawing/2014/main" id="{ED665F4E-3152-67D8-96D9-285478E8C970}"/>
+              </a:ext>
+            </a:extLst>
+          </p:cNvPr>
+          <p:cNvPicPr>
+            <a:picLocks noChangeAspect="1" noChangeArrowheads="1"/>
+          </p:cNvPicPr>
+          <p:nvPr/>
+        </p:nvPicPr>
+        <p:blipFill>
+          <a:blip r:embed="rId4">
+            <a:extLst>
+              <a:ext uri="{BEBA8EAE-BF5A-486C-A8C5-ECC9F3942E4B}">
+                <a14:imgProps xmlns:a14="http://schemas.microsoft.com/office/drawing/2010/main">
+                  <a14:imgLayer r:embed="rId5">
+                    <a14:imgEffect>
+                      <a14:brightnessContrast bright="100000"/>
+                    </a14:imgEffect>
+                  </a14:imgLayer>
+                </a14:imgProps>
+              </a:ext>
+              <a:ext uri="{28A0092B-C50C-407E-A947-70E740481C1C}">
+                <a14:useLocalDpi xmlns:a14="http://schemas.microsoft.com/office/drawing/2010/main" val="0"/>
+              </a:ext>
+            </a:extLst>
+          </a:blip>
+          <a:srcRect/>
+          <a:stretch>
+            <a:fillRect/>
+          </a:stretch>
+        </p:blipFill>
+        <p:spPr bwMode="auto">
+          <a:xfrm>
+            <a:off x="2765932" y="2742111"/>
+            <a:ext cx="240286" cy="240286"/>
+          </a:xfrm>
+          <a:prstGeom prst="rect">
+            <a:avLst/>
+          </a:prstGeom>
+          <a:noFill/>
+          <a:extLst>
+            <a:ext uri="{909E8E84-426E-40DD-AFC4-6F175D3DCCD1}">
+              <a14:hiddenFill xmlns:a14="http://schemas.microsoft.com/office/drawing/2010/main">
+                <a:solidFill>
+                  <a:srgbClr val="FFFFFF"/>
+                </a:solidFill>
+              </a14:hiddenFill>
+            </a:ext>
+          </a:extLst>
+        </p:spPr>
+      </p:pic>
+      <p:sp>
+        <p:nvSpPr>
+          <p:cNvPr id="17" name="TextBox 16">
+            <a:extLst>
+              <a:ext uri="{FF2B5EF4-FFF2-40B4-BE49-F238E27FC236}">
+                <a16:creationId xmlns:a16="http://schemas.microsoft.com/office/drawing/2014/main" id="{98D95E70-0318-F8ED-55CD-2577D9AAEF8F}"/>
+              </a:ext>
+            </a:extLst>
+          </p:cNvPr>
+          <p:cNvSpPr txBox="1"/>
+          <p:nvPr/>
+        </p:nvSpPr>
+        <p:spPr>
+          <a:xfrm>
+            <a:off x="2703207" y="2242639"/>
+            <a:ext cx="397646" cy="369332"/>
+          </a:xfrm>
+          <a:prstGeom prst="rect">
+            <a:avLst/>
+          </a:prstGeom>
+          <a:noFill/>
+        </p:spPr>
+        <p:txBody>
+          <a:bodyPr wrap="square">
+            <a:spAutoFit/>
+          </a:bodyPr>
+          <a:lstStyle/>
+          <a:p>
+            <a:r>
+              <a:rPr lang="en-US" sz="1800" dirty="0">
+                <a:solidFill>
+                  <a:schemeClr val="bg2"/>
+                </a:solidFill>
+                <a:latin typeface="Segoe Fluent Icons" panose="050A0102010101010101" pitchFamily="18" charset="0"/>
+              </a:rPr>
+              <a:t></a:t>
+            </a:r>
+            <a:endParaRPr lang="en-US" sz="1800" dirty="0">
+              <a:solidFill>
+                <a:schemeClr val="bg2"/>
+              </a:solidFill>
+              <a:latin typeface="MS Shell Dlg 2" panose="020B0604030504040204" pitchFamily="34" charset="0"/>
+            </a:endParaRPr>
+          </a:p>
+        </p:txBody>
+      </p:sp>
+      <p:sp>
+        <p:nvSpPr>
+          <p:cNvPr id="18" name="Rectangle: Rounded Corners 17">
+            <a:extLst>
+              <a:ext uri="{FF2B5EF4-FFF2-40B4-BE49-F238E27FC236}">
+                <a16:creationId xmlns:a16="http://schemas.microsoft.com/office/drawing/2014/main" id="{97837270-46C5-8C72-C214-76EFE532CBEB}"/>
+              </a:ext>
+            </a:extLst>
+          </p:cNvPr>
+          <p:cNvSpPr/>
+          <p:nvPr/>
+        </p:nvSpPr>
+        <p:spPr>
+          <a:xfrm>
+            <a:off x="2712391" y="1371996"/>
+            <a:ext cx="352982" cy="367423"/>
+          </a:xfrm>
+          <a:prstGeom prst="roundRect">
+            <a:avLst/>
+          </a:prstGeom>
+          <a:solidFill>
+            <a:schemeClr val="accent4">
+              <a:alpha val="50000"/>
+            </a:schemeClr>
+          </a:solidFill>
+          <a:ln>
+            <a:noFill/>
+          </a:ln>
+        </p:spPr>
+        <p:style>
+          <a:lnRef idx="0">
+            <a:scrgbClr r="0" g="0" b="0"/>
+          </a:lnRef>
+          <a:fillRef idx="0">
+            <a:scrgbClr r="0" g="0" b="0"/>
+          </a:fillRef>
+          <a:effectRef idx="0">
+            <a:scrgbClr r="0" g="0" b="0"/>
+          </a:effectRef>
+          <a:fontRef idx="minor">
+            <a:schemeClr val="lt1"/>
+          </a:fontRef>
+        </p:style>
+        <p:txBody>
+          <a:bodyPr rtlCol="0" anchor="ctr"/>
+          <a:lstStyle/>
+          <a:p>
+            <a:pPr algn="ctr"/>
+            <a:endParaRPr lang="en-US"/>
+          </a:p>
+        </p:txBody>
+      </p:sp>
+      <p:sp>
+        <p:nvSpPr>
+          <p:cNvPr id="13" name="TextBox 12">
+            <a:extLst>
+              <a:ext uri="{FF2B5EF4-FFF2-40B4-BE49-F238E27FC236}">
+                <a16:creationId xmlns:a16="http://schemas.microsoft.com/office/drawing/2014/main" id="{22009835-AB5F-0DE5-3FEC-D62E603BED04}"/>
+              </a:ext>
+            </a:extLst>
+          </p:cNvPr>
+          <p:cNvSpPr txBox="1"/>
+          <p:nvPr/>
+        </p:nvSpPr>
+        <p:spPr>
+          <a:xfrm>
+            <a:off x="2684368" y="1346292"/>
+            <a:ext cx="448234" cy="369332"/>
+          </a:xfrm>
+          <a:prstGeom prst="rect">
+            <a:avLst/>
+          </a:prstGeom>
+          <a:noFill/>
+        </p:spPr>
+        <p:txBody>
+          <a:bodyPr wrap="square">
+            <a:spAutoFit/>
+          </a:bodyPr>
+          <a:lstStyle/>
+          <a:p>
+            <a:r>
+              <a:rPr lang="en-US" sz="1800" dirty="0">
+                <a:solidFill>
+                  <a:schemeClr val="bg2"/>
+                </a:solidFill>
+                <a:latin typeface="Wingdings" panose="05000000000000000000" pitchFamily="2" charset="2"/>
+              </a:rPr>
+              <a:t>4</a:t>
+            </a:r>
+            <a:endParaRPr lang="en-US" sz="1000" dirty="0">
+              <a:solidFill>
+                <a:schemeClr val="bg2"/>
+              </a:solidFill>
+              <a:latin typeface="MS Shell Dlg 2" panose="020B0604030504040204" pitchFamily="34" charset="0"/>
+            </a:endParaRPr>
+          </a:p>
+        </p:txBody>
+      </p:sp>
+      <p:pic>
+        <p:nvPicPr>
+          <p:cNvPr id="22" name="Picture 21">
+            <a:extLst>
+              <a:ext uri="{FF2B5EF4-FFF2-40B4-BE49-F238E27FC236}">
+                <a16:creationId xmlns:a16="http://schemas.microsoft.com/office/drawing/2014/main" id="{13C073FE-22FD-ABF2-FEBD-E9DE9F41A87A}"/>
+              </a:ext>
+            </a:extLst>
+          </p:cNvPr>
+          <p:cNvPicPr>
+            <a:picLocks noChangeAspect="1"/>
+          </p:cNvPicPr>
+          <p:nvPr/>
+        </p:nvPicPr>
+        <p:blipFill>
+          <a:blip r:embed="rId6">
+            <a:clrChange>
+              <a:clrFrom>
+                <a:srgbClr val="FFFFFF"/>
+              </a:clrFrom>
+              <a:clrTo>
+                <a:srgbClr val="FFFFFF">
+                  <a:alpha val="0"/>
+                </a:srgbClr>
+              </a:clrTo>
+            </a:clrChange>
+            <a:duotone>
+              <a:schemeClr val="bg2">
+                <a:shade val="45000"/>
+                <a:satMod val="135000"/>
+              </a:schemeClr>
+              <a:prstClr val="white"/>
+            </a:duotone>
+          </a:blip>
+          <a:stretch>
+            <a:fillRect/>
+          </a:stretch>
+        </p:blipFill>
+        <p:spPr>
+          <a:xfrm>
+            <a:off x="5387030" y="1245000"/>
+            <a:ext cx="3972479" cy="304843"/>
+          </a:xfrm>
+          <a:prstGeom prst="rect">
+            <a:avLst/>
+          </a:prstGeom>
+        </p:spPr>
+      </p:pic>
+      <p:sp>
+        <p:nvSpPr>
+          <p:cNvPr id="24" name="TextBox 23">
+            <a:extLst>
+              <a:ext uri="{FF2B5EF4-FFF2-40B4-BE49-F238E27FC236}">
+                <a16:creationId xmlns:a16="http://schemas.microsoft.com/office/drawing/2014/main" id="{735E82DF-883E-79C9-B9F0-238CBD490717}"/>
+              </a:ext>
+            </a:extLst>
+          </p:cNvPr>
+          <p:cNvSpPr txBox="1"/>
+          <p:nvPr/>
+        </p:nvSpPr>
+        <p:spPr>
+          <a:xfrm>
+            <a:off x="2703207" y="1811195"/>
+            <a:ext cx="474387" cy="369332"/>
+          </a:xfrm>
+          <a:prstGeom prst="rect">
+            <a:avLst/>
+          </a:prstGeom>
+          <a:noFill/>
+        </p:spPr>
+        <p:txBody>
+          <a:bodyPr wrap="square">
+            <a:spAutoFit/>
+          </a:bodyPr>
+          <a:lstStyle/>
+          <a:p>
+            <a:r>
+              <a:rPr lang="en-US" sz="1800" dirty="0">
+                <a:solidFill>
+                  <a:schemeClr val="bg2"/>
+                </a:solidFill>
+                <a:latin typeface="Segoe MDL2 Assets" panose="050A0102010101010101" pitchFamily="18" charset="0"/>
+              </a:rPr>
+              <a:t></a:t>
+            </a:r>
+            <a:endParaRPr lang="en-US" sz="1000" dirty="0">
+              <a:solidFill>
+                <a:schemeClr val="bg2"/>
+              </a:solidFill>
+              <a:latin typeface="MS Shell Dlg 2" panose="020B0604030504040204" pitchFamily="34" charset="0"/>
+            </a:endParaRPr>
+          </a:p>
+        </p:txBody>
+      </p:sp>
+      <p:sp>
+        <p:nvSpPr>
+          <p:cNvPr id="28" name="TextBox 27">
+            <a:extLst>
+              <a:ext uri="{FF2B5EF4-FFF2-40B4-BE49-F238E27FC236}">
+                <a16:creationId xmlns:a16="http://schemas.microsoft.com/office/drawing/2014/main" id="{0FC13FA7-F527-5AA6-9F02-F8A26480A858}"/>
+              </a:ext>
+            </a:extLst>
+          </p:cNvPr>
+          <p:cNvSpPr txBox="1"/>
+          <p:nvPr/>
+        </p:nvSpPr>
+        <p:spPr>
+          <a:xfrm>
+            <a:off x="2687517" y="5677380"/>
+            <a:ext cx="490077" cy="923330"/>
+          </a:xfrm>
+          <a:prstGeom prst="rect">
+            <a:avLst/>
+          </a:prstGeom>
+          <a:noFill/>
+        </p:spPr>
+        <p:txBody>
+          <a:bodyPr wrap="square">
+            <a:spAutoFit/>
+          </a:bodyPr>
+          <a:lstStyle/>
+          <a:p>
+            <a:r>
+              <a:rPr lang="en-US" sz="1800" dirty="0">
+                <a:solidFill>
+                  <a:schemeClr val="bg2"/>
+                </a:solidFill>
+                <a:latin typeface="Segoe Fluent Icons" panose="050A0102010101010101" pitchFamily="18" charset="0"/>
+              </a:rPr>
+              <a:t></a:t>
+            </a:r>
+            <a:endParaRPr lang="en-US" sz="900" dirty="0">
+              <a:solidFill>
+                <a:schemeClr val="bg2"/>
+              </a:solidFill>
+              <a:latin typeface="Segoe Fluent Icons" panose="050A0102010101010101" pitchFamily="18" charset="0"/>
+            </a:endParaRPr>
+          </a:p>
+          <a:p>
+            <a:endParaRPr lang="en-US" sz="800" dirty="0">
+              <a:solidFill>
+                <a:schemeClr val="bg2"/>
+              </a:solidFill>
+              <a:latin typeface="Segoe Fluent Icons" panose="050A0102010101010101" pitchFamily="18" charset="0"/>
+            </a:endParaRPr>
+          </a:p>
+          <a:p>
+            <a:r>
+              <a:rPr lang="en-US" sz="1800" dirty="0">
+                <a:solidFill>
+                  <a:schemeClr val="bg2"/>
+                </a:solidFill>
+                <a:latin typeface="Segoe Fluent Icons" panose="050A0102010101010101" pitchFamily="18" charset="0"/>
+              </a:rPr>
+              <a:t></a:t>
+            </a:r>
+            <a:endParaRPr lang="en-US" sz="1800" dirty="0">
+              <a:solidFill>
+                <a:schemeClr val="bg2"/>
+              </a:solidFill>
+              <a:latin typeface="MS Shell Dlg 2" panose="020B0604030504040204" pitchFamily="34" charset="0"/>
+            </a:endParaRPr>
+          </a:p>
+          <a:p>
+            <a:endParaRPr lang="en-US" sz="1000" dirty="0">
+              <a:solidFill>
+                <a:schemeClr val="bg2"/>
+              </a:solidFill>
+              <a:latin typeface="MS Shell Dlg 2" panose="020B0604030504040204" pitchFamily="34" charset="0"/>
+            </a:endParaRPr>
+          </a:p>
+        </p:txBody>
+      </p:sp>
+      <p:sp>
+        <p:nvSpPr>
+          <p:cNvPr id="1031" name="TextBox 1030">
+            <a:extLst>
+              <a:ext uri="{FF2B5EF4-FFF2-40B4-BE49-F238E27FC236}">
+                <a16:creationId xmlns:a16="http://schemas.microsoft.com/office/drawing/2014/main" id="{26660F31-1D9F-B148-0F5C-52AC4DF0CCFA}"/>
+              </a:ext>
+            </a:extLst>
+          </p:cNvPr>
+          <p:cNvSpPr txBox="1"/>
+          <p:nvPr/>
+        </p:nvSpPr>
+        <p:spPr>
+          <a:xfrm>
+            <a:off x="5002163" y="1256957"/>
+            <a:ext cx="6835585" cy="307777"/>
+          </a:xfrm>
+          <a:prstGeom prst="rect">
+            <a:avLst/>
+          </a:prstGeom>
+          <a:noFill/>
+        </p:spPr>
+        <p:txBody>
+          <a:bodyPr wrap="square">
+            <a:spAutoFit/>
+          </a:bodyPr>
+          <a:lstStyle/>
+          <a:p>
+            <a:r>
+              <a:rPr lang="en-US" sz="1400" dirty="0">
+                <a:solidFill>
+                  <a:schemeClr val="bg2"/>
+                </a:solidFill>
+                <a:latin typeface="Segoe Fluent Icons" panose="050A0102010101010101" pitchFamily="18" charset="0"/>
+              </a:rPr>
+              <a:t> </a:t>
+            </a:r>
+            <a:r>
+              <a:rPr lang="en-US" sz="1400" dirty="0">
+                <a:solidFill>
+                  <a:schemeClr val="bg2"/>
+                </a:solidFill>
+                <a:latin typeface="Open Sans" panose="020B0606030504020204" pitchFamily="34" charset="0"/>
+                <a:ea typeface="Open Sans" panose="020B0606030504020204" pitchFamily="34" charset="0"/>
+                <a:cs typeface="Open Sans" panose="020B0606030504020204" pitchFamily="34" charset="0"/>
+              </a:rPr>
+              <a:t>|                                                                                    </a:t>
+            </a:r>
+            <a:r>
+              <a:rPr lang="en-US" sz="1400" dirty="0">
+                <a:solidFill>
+                  <a:schemeClr val="bg2"/>
+                </a:solidFill>
+                <a:latin typeface="Segoe Fluent Icons" panose="050A0102010101010101" pitchFamily="18" charset="0"/>
+              </a:rPr>
+              <a:t> </a:t>
+            </a:r>
+            <a:r>
+              <a:rPr lang="en-US" sz="1400" dirty="0">
+                <a:solidFill>
+                  <a:schemeClr val="bg2"/>
+                </a:solidFill>
+                <a:latin typeface="Open Sans" panose="020B0606030504020204" pitchFamily="34" charset="0"/>
+                <a:ea typeface="Open Sans" panose="020B0606030504020204" pitchFamily="34" charset="0"/>
+                <a:cs typeface="Open Sans" panose="020B0606030504020204" pitchFamily="34" charset="0"/>
+              </a:rPr>
+              <a:t>|</a:t>
+            </a:r>
+            <a:r>
+              <a:rPr lang="en-US" sz="1400" dirty="0">
+                <a:solidFill>
+                  <a:schemeClr val="bg2"/>
+                </a:solidFill>
+                <a:latin typeface="Segoe Fluent Icons" panose="050A0102010101010101" pitchFamily="18" charset="0"/>
+              </a:rPr>
+              <a:t>  </a:t>
+            </a:r>
+            <a:endParaRPr lang="en-US" sz="800" dirty="0">
+              <a:solidFill>
+                <a:schemeClr val="bg2"/>
+              </a:solidFill>
+              <a:latin typeface="MS Shell Dlg 2" panose="020B0604030504040204" pitchFamily="34" charset="0"/>
+            </a:endParaRPr>
+          </a:p>
+        </p:txBody>
+      </p:sp>
+      <p:pic>
+        <p:nvPicPr>
+          <p:cNvPr id="3" name="Picture 2">
+            <a:extLst>
+              <a:ext uri="{FF2B5EF4-FFF2-40B4-BE49-F238E27FC236}">
+                <a16:creationId xmlns:a16="http://schemas.microsoft.com/office/drawing/2014/main" id="{B9DD518A-20E0-E432-45EA-EA54A6F8B459}"/>
+              </a:ext>
+            </a:extLst>
+          </p:cNvPr>
+          <p:cNvPicPr>
+            <a:picLocks noChangeAspect="1"/>
+          </p:cNvPicPr>
+          <p:nvPr/>
+        </p:nvPicPr>
+        <p:blipFill>
+          <a:blip r:embed="rId7">
+            <a:duotone>
+              <a:schemeClr val="bg2">
+                <a:shade val="45000"/>
+                <a:satMod val="135000"/>
+              </a:schemeClr>
+              <a:prstClr val="white"/>
+            </a:duotone>
+            <a:extLst>
+              <a:ext uri="{28A0092B-C50C-407E-A947-70E740481C1C}">
+                <a14:useLocalDpi xmlns:a14="http://schemas.microsoft.com/office/drawing/2010/main" val="0"/>
+              </a:ext>
+            </a:extLst>
+          </a:blip>
+          <a:stretch>
+            <a:fillRect/>
+          </a:stretch>
+        </p:blipFill>
+        <p:spPr>
+          <a:xfrm>
+            <a:off x="2808699" y="1054530"/>
+            <a:ext cx="163102" cy="163102"/>
+          </a:xfrm>
+          <a:prstGeom prst="rect">
+            <a:avLst/>
+          </a:prstGeom>
+        </p:spPr>
+      </p:pic>
+    </p:spTree>
+    <p:extLst>
+      <p:ext uri="{BB962C8B-B14F-4D97-AF65-F5344CB8AC3E}">
+        <p14:creationId xmlns:p14="http://schemas.microsoft.com/office/powerpoint/2010/main" val="3846648972"/>
+      </p:ext>
+    </p:extLst>
+  </p:cSld>
+  <p:clrMapOvr>
+    <a:masterClrMapping/>
+  </p:clrMapOvr>
+</p:sld>
+</file>
+
 <file path=ppt/theme/theme1.xml><?xml version="1.0" encoding="utf-8"?>
 <a:theme xmlns:a="http://schemas.openxmlformats.org/drawingml/2006/main" name="Office Theme">
   <a:themeElements>

</xml_diff>